<commit_message>
update relazione e presentazione
</commit_message>
<xml_diff>
--- a/Presentazione/presentazione TaxiToGo.pptx
+++ b/Presentazione/presentazione TaxiToGo.pptx
@@ -5,10 +5,10 @@
     <p:sldMasterId id="2147483712" r:id="rId1"/>
   </p:sldMasterIdLst>
   <p:notesMasterIdLst>
-    <p:notesMasterId r:id="rId14"/>
+    <p:notesMasterId r:id="rId15"/>
   </p:notesMasterIdLst>
   <p:handoutMasterIdLst>
-    <p:handoutMasterId r:id="rId15"/>
+    <p:handoutMasterId r:id="rId16"/>
   </p:handoutMasterIdLst>
   <p:sldIdLst>
     <p:sldId id="257" r:id="rId2"/>
@@ -23,6 +23,7 @@
     <p:sldId id="270" r:id="rId11"/>
     <p:sldId id="271" r:id="rId12"/>
     <p:sldId id="272" r:id="rId13"/>
+    <p:sldId id="273" r:id="rId14"/>
   </p:sldIdLst>
   <p:sldSz cx="12192000" cy="6858000"/>
   <p:notesSz cx="6858000" cy="9144000"/>
@@ -7097,6 +7098,406 @@
     <p:extLst>
       <p:ext uri="{BB962C8B-B14F-4D97-AF65-F5344CB8AC3E}">
         <p14:creationId xmlns:p14="http://schemas.microsoft.com/office/powerpoint/2010/main" val="2616922299"/>
+      </p:ext>
+    </p:extLst>
+  </p:cSld>
+  <p:clrMapOvr>
+    <a:masterClrMapping/>
+  </p:clrMapOvr>
+</p:sld>
+</file>
+
+<file path=ppt/slides/slide13.xml><?xml version="1.0" encoding="utf-8"?>
+<p:sld xmlns:a="http://schemas.openxmlformats.org/drawingml/2006/main" xmlns:r="http://schemas.openxmlformats.org/officeDocument/2006/relationships" xmlns:p="http://schemas.openxmlformats.org/presentationml/2006/main">
+  <p:cSld>
+    <p:spTree>
+      <p:nvGrpSpPr>
+        <p:cNvPr id="1" name="">
+          <a:extLst>
+            <a:ext uri="{FF2B5EF4-FFF2-40B4-BE49-F238E27FC236}">
+              <a16:creationId xmlns:a16="http://schemas.microsoft.com/office/drawing/2014/main" id="{2D57A686-B9BE-FE8B-17D4-92C2F41CEB84}"/>
+            </a:ext>
+          </a:extLst>
+        </p:cNvPr>
+        <p:cNvGrpSpPr/>
+        <p:nvPr/>
+      </p:nvGrpSpPr>
+      <p:grpSpPr>
+        <a:xfrm>
+          <a:off x="0" y="0"/>
+          <a:ext cx="0" cy="0"/>
+          <a:chOff x="0" y="0"/>
+          <a:chExt cx="0" cy="0"/>
+        </a:xfrm>
+      </p:grpSpPr>
+      <p:sp>
+        <p:nvSpPr>
+          <p:cNvPr id="2" name="Titolo 1">
+            <a:extLst>
+              <a:ext uri="{FF2B5EF4-FFF2-40B4-BE49-F238E27FC236}">
+                <a16:creationId xmlns:a16="http://schemas.microsoft.com/office/drawing/2014/main" id="{4B60B2D4-FCB3-5B66-1D3E-BB423044106F}"/>
+              </a:ext>
+            </a:extLst>
+          </p:cNvPr>
+          <p:cNvSpPr>
+            <a:spLocks noGrp="1"/>
+          </p:cNvSpPr>
+          <p:nvPr>
+            <p:ph type="title"/>
+          </p:nvPr>
+        </p:nvSpPr>
+        <p:spPr/>
+        <p:txBody>
+          <a:bodyPr/>
+          <a:lstStyle/>
+          <a:p>
+            <a:r>
+              <a:rPr lang="it-IT" dirty="0"/>
+              <a:t>Progettazione – Design Patterns Utilizzati</a:t>
+            </a:r>
+          </a:p>
+        </p:txBody>
+      </p:sp>
+      <p:sp>
+        <p:nvSpPr>
+          <p:cNvPr id="4" name="Segnaposto data 3">
+            <a:extLst>
+              <a:ext uri="{FF2B5EF4-FFF2-40B4-BE49-F238E27FC236}">
+                <a16:creationId xmlns:a16="http://schemas.microsoft.com/office/drawing/2014/main" id="{D2B0C686-E2CE-516A-9530-F3618A5F5727}"/>
+              </a:ext>
+            </a:extLst>
+          </p:cNvPr>
+          <p:cNvSpPr>
+            <a:spLocks noGrp="1"/>
+          </p:cNvSpPr>
+          <p:nvPr>
+            <p:ph type="dt" sz="half" idx="10"/>
+          </p:nvPr>
+        </p:nvSpPr>
+        <p:spPr>
+          <a:xfrm>
+            <a:off x="8766009" y="4784562"/>
+            <a:ext cx="2844799" cy="365125"/>
+          </a:xfrm>
+        </p:spPr>
+        <p:txBody>
+          <a:bodyPr/>
+          <a:lstStyle/>
+          <a:p>
+            <a:pPr rtl="0"/>
+            <a:r>
+              <a:rPr lang="it-IT"/>
+              <a:t>    </a:t>
+            </a:r>
+            <a:endParaRPr lang="en-US" dirty="0"/>
+          </a:p>
+        </p:txBody>
+      </p:sp>
+      <p:sp>
+        <p:nvSpPr>
+          <p:cNvPr id="5" name="CasellaDiTesto 4">
+            <a:extLst>
+              <a:ext uri="{FF2B5EF4-FFF2-40B4-BE49-F238E27FC236}">
+                <a16:creationId xmlns:a16="http://schemas.microsoft.com/office/drawing/2014/main" id="{F2B5D141-53E6-70C9-FECC-7F3F4D39C4D8}"/>
+              </a:ext>
+            </a:extLst>
+          </p:cNvPr>
+          <p:cNvSpPr txBox="1"/>
+          <p:nvPr/>
+        </p:nvSpPr>
+        <p:spPr>
+          <a:xfrm>
+            <a:off x="581190" y="2245405"/>
+            <a:ext cx="8001333" cy="3693319"/>
+          </a:xfrm>
+          <a:prstGeom prst="rect">
+            <a:avLst/>
+          </a:prstGeom>
+          <a:noFill/>
+        </p:spPr>
+        <p:txBody>
+          <a:bodyPr wrap="square" rtlCol="0">
+            <a:spAutoFit/>
+          </a:bodyPr>
+          <a:lstStyle/>
+          <a:p>
+            <a:pPr marL="285750" indent="-285750">
+              <a:buFont typeface="Arial" panose="020B0604020202020204" pitchFamily="34" charset="0"/>
+              <a:buChar char="•"/>
+            </a:pPr>
+            <a:r>
+              <a:rPr lang="it-IT" b="1" dirty="0"/>
+              <a:t>Observer</a:t>
+            </a:r>
+            <a:r>
+              <a:rPr lang="it-IT" b="1" dirty="0">
+                <a:effectLst/>
+              </a:rPr>
+              <a:t>: </a:t>
+            </a:r>
+            <a:r>
+              <a:rPr lang="it-IT" dirty="0">
+                <a:effectLst/>
+              </a:rPr>
+              <a:t>la classe </a:t>
+            </a:r>
+            <a:r>
+              <a:rPr lang="it-IT" dirty="0" err="1">
+                <a:effectLst/>
+              </a:rPr>
+              <a:t>emailListener</a:t>
+            </a:r>
+            <a:r>
+              <a:rPr lang="it-IT" dirty="0">
+                <a:effectLst/>
+              </a:rPr>
+              <a:t> implementa l’interfaccia «</a:t>
+            </a:r>
+            <a:r>
+              <a:rPr lang="it-IT" dirty="0" err="1">
+                <a:effectLst/>
+              </a:rPr>
+              <a:t>MessageCountListener</a:t>
+            </a:r>
+            <a:r>
+              <a:rPr lang="it-IT" dirty="0">
+                <a:effectLst/>
+              </a:rPr>
+              <a:t>», </a:t>
+            </a:r>
+            <a:r>
+              <a:rPr lang="it-IT" dirty="0" err="1">
+                <a:effectLst/>
+              </a:rPr>
+              <a:t>EmailListener</a:t>
+            </a:r>
+            <a:r>
+              <a:rPr lang="it-IT" dirty="0">
+                <a:effectLst/>
+              </a:rPr>
+              <a:t> in questo caso osserva i cambiamenti nel conteggio dei messaggi nella cartella IMAP.</a:t>
+            </a:r>
+            <a:br>
+              <a:rPr lang="it-IT" dirty="0">
+                <a:effectLst/>
+              </a:rPr>
+            </a:br>
+            <a:endParaRPr lang="it-IT" dirty="0">
+              <a:effectLst/>
+            </a:endParaRPr>
+          </a:p>
+          <a:p>
+            <a:pPr marL="285750" indent="-285750">
+              <a:buFont typeface="Arial" panose="020B0604020202020204" pitchFamily="34" charset="0"/>
+              <a:buChar char="•"/>
+            </a:pPr>
+            <a:r>
+              <a:rPr lang="it-IT" b="1" dirty="0"/>
+              <a:t>Strategy: </a:t>
+            </a:r>
+            <a:r>
+              <a:rPr lang="it-IT" dirty="0"/>
+              <a:t>nel metodo </a:t>
+            </a:r>
+            <a:r>
+              <a:rPr lang="it-IT" dirty="0" err="1"/>
+              <a:t>extractTextFromMultipart</a:t>
+            </a:r>
+            <a:r>
+              <a:rPr lang="it-IT" dirty="0"/>
+              <a:t> di </a:t>
+            </a:r>
+            <a:r>
+              <a:rPr lang="it-IT" dirty="0" err="1"/>
+              <a:t>EmailListener</a:t>
+            </a:r>
+            <a:r>
+              <a:rPr lang="it-IT" dirty="0"/>
+              <a:t> il codice varia in base al tipo di contenuto (</a:t>
+            </a:r>
+            <a:r>
+              <a:rPr lang="it-IT" dirty="0" err="1"/>
+              <a:t>plain</a:t>
+            </a:r>
+            <a:r>
+              <a:rPr lang="it-IT" dirty="0"/>
+              <a:t> text, html o </a:t>
+            </a:r>
+            <a:r>
+              <a:rPr lang="it-IT" dirty="0" err="1"/>
+              <a:t>multipart</a:t>
+            </a:r>
+            <a:r>
+              <a:rPr lang="it-IT" dirty="0"/>
+              <a:t>).</a:t>
+            </a:r>
+          </a:p>
+          <a:p>
+            <a:pPr marL="285750" indent="-285750">
+              <a:buFont typeface="Arial" panose="020B0604020202020204" pitchFamily="34" charset="0"/>
+              <a:buChar char="•"/>
+            </a:pPr>
+            <a:endParaRPr lang="it-IT" dirty="0"/>
+          </a:p>
+          <a:p>
+            <a:pPr marL="285750" indent="-285750">
+              <a:buFont typeface="Arial" panose="020B0604020202020204" pitchFamily="34" charset="0"/>
+              <a:buChar char="•"/>
+            </a:pPr>
+            <a:r>
+              <a:rPr lang="it-IT" b="1" dirty="0" err="1"/>
+              <a:t>Dependency</a:t>
+            </a:r>
+            <a:r>
+              <a:rPr lang="it-IT" dirty="0"/>
+              <a:t> </a:t>
+            </a:r>
+            <a:r>
+              <a:rPr lang="it-IT" b="1" dirty="0"/>
+              <a:t>Injection</a:t>
+            </a:r>
+            <a:r>
+              <a:rPr lang="it-IT" dirty="0"/>
+              <a:t>:  utilizzando le </a:t>
+            </a:r>
+            <a:r>
+              <a:rPr lang="it-IT" dirty="0" err="1"/>
+              <a:t>annotation</a:t>
+            </a:r>
+            <a:r>
+              <a:rPr lang="it-IT" dirty="0"/>
+              <a:t> @</a:t>
+            </a:r>
+            <a:r>
+              <a:rPr lang="it-IT" dirty="0" err="1"/>
+              <a:t>Autowired</a:t>
+            </a:r>
+            <a:r>
+              <a:rPr lang="it-IT" dirty="0"/>
+              <a:t>, andando ad iniettare </a:t>
+            </a:r>
+            <a:r>
+              <a:rPr lang="it-IT" dirty="0" err="1"/>
+              <a:t>automaticamnte</a:t>
+            </a:r>
+            <a:r>
+              <a:rPr lang="it-IT" dirty="0"/>
+              <a:t> l’istanza </a:t>
+            </a:r>
+            <a:r>
+              <a:rPr lang="it-IT" dirty="0" err="1"/>
+              <a:t>EmailService</a:t>
+            </a:r>
+            <a:r>
+              <a:rPr lang="it-IT" dirty="0"/>
+              <a:t> quando viene </a:t>
+            </a:r>
+            <a:r>
+              <a:rPr lang="it-IT" dirty="0" err="1"/>
+              <a:t>instanziato</a:t>
+            </a:r>
+            <a:r>
+              <a:rPr lang="it-IT" dirty="0"/>
+              <a:t> l’</a:t>
+            </a:r>
+            <a:r>
+              <a:rPr lang="it-IT" dirty="0" err="1"/>
+              <a:t>emailListener</a:t>
+            </a:r>
+            <a:r>
+              <a:rPr lang="it-IT" dirty="0"/>
+              <a:t>.</a:t>
+            </a:r>
+          </a:p>
+          <a:p>
+            <a:endParaRPr lang="it-IT" dirty="0">
+              <a:effectLst/>
+            </a:endParaRPr>
+          </a:p>
+          <a:p>
+            <a:br>
+              <a:rPr lang="it-IT" b="0" i="0" dirty="0">
+                <a:solidFill>
+                  <a:srgbClr val="5D6879"/>
+                </a:solidFill>
+                <a:effectLst/>
+                <a:latin typeface="Lato" panose="020B0604020202020204" pitchFamily="34" charset="0"/>
+              </a:rPr>
+            </a:br>
+            <a:endParaRPr lang="it-IT" dirty="0"/>
+          </a:p>
+        </p:txBody>
+      </p:sp>
+      <p:pic>
+        <p:nvPicPr>
+          <p:cNvPr id="7" name="Immagine 6">
+            <a:extLst>
+              <a:ext uri="{FF2B5EF4-FFF2-40B4-BE49-F238E27FC236}">
+                <a16:creationId xmlns:a16="http://schemas.microsoft.com/office/drawing/2014/main" id="{3E395350-D468-E144-9120-8E1C2B507C9F}"/>
+              </a:ext>
+            </a:extLst>
+          </p:cNvPr>
+          <p:cNvPicPr>
+            <a:picLocks noChangeAspect="1"/>
+          </p:cNvPicPr>
+          <p:nvPr/>
+        </p:nvPicPr>
+        <p:blipFill>
+          <a:blip r:embed="rId2">
+            <a:extLst>
+              <a:ext uri="{28A0092B-C50C-407E-A947-70E740481C1C}">
+                <a14:useLocalDpi xmlns:a14="http://schemas.microsoft.com/office/drawing/2010/main" val="0"/>
+              </a:ext>
+            </a:extLst>
+          </a:blip>
+          <a:stretch>
+            <a:fillRect/>
+          </a:stretch>
+        </p:blipFill>
+        <p:spPr>
+          <a:xfrm>
+            <a:off x="8134183" y="1890876"/>
+            <a:ext cx="3476625" cy="3810000"/>
+          </a:xfrm>
+          <a:prstGeom prst="rect">
+            <a:avLst/>
+          </a:prstGeom>
+        </p:spPr>
+      </p:pic>
+      <p:sp>
+        <p:nvSpPr>
+          <p:cNvPr id="8" name="Segnaposto numero diapositiva 7">
+            <a:extLst>
+              <a:ext uri="{FF2B5EF4-FFF2-40B4-BE49-F238E27FC236}">
+                <a16:creationId xmlns:a16="http://schemas.microsoft.com/office/drawing/2014/main" id="{61003198-77B3-3609-1530-B55D048F5AE1}"/>
+              </a:ext>
+            </a:extLst>
+          </p:cNvPr>
+          <p:cNvSpPr>
+            <a:spLocks noGrp="1"/>
+          </p:cNvSpPr>
+          <p:nvPr>
+            <p:ph type="sldNum" sz="quarter" idx="12"/>
+          </p:nvPr>
+        </p:nvSpPr>
+        <p:spPr/>
+        <p:txBody>
+          <a:bodyPr/>
+          <a:lstStyle/>
+          <a:p>
+            <a:pPr rtl="0"/>
+            <a:fld id="{3A98EE3D-8CD1-4C3F-BD1C-C98C9596463C}" type="slidenum">
+              <a:rPr lang="en-US" smtClean="0"/>
+              <a:t>13</a:t>
+            </a:fld>
+            <a:endParaRPr lang="en-US" dirty="0"/>
+          </a:p>
+        </p:txBody>
+      </p:sp>
+    </p:spTree>
+    <p:extLst>
+      <p:ext uri="{BB962C8B-B14F-4D97-AF65-F5344CB8AC3E}">
+        <p14:creationId xmlns:p14="http://schemas.microsoft.com/office/powerpoint/2010/main" val="831359135"/>
       </p:ext>
     </p:extLst>
   </p:cSld>

</xml_diff>